<commit_message>
django ppt, jsp ppt
</commit_message>
<xml_diff>
--- a/django_ppt/blog_ppt/3장. blog 회원 관리.pptx
+++ b/django_ppt/blog_ppt/3장. blog 회원 관리.pptx
@@ -247,7 +247,7 @@
           <a:p>
             <a:fld id="{7665CDAC-D627-4E87-877A-1B781DD4CADC}" type="datetimeFigureOut">
               <a:rPr lang="ko-KR" altLang="en-US" smtClean="0"/>
-              <a:t>2023-07-07</a:t>
+              <a:t>2023-07-08</a:t>
             </a:fld>
             <a:endParaRPr lang="ko-KR" altLang="en-US"/>
           </a:p>
@@ -659,7 +659,7 @@
           <a:p>
             <a:fld id="{C25BCFD5-C4DF-4EBC-B718-C69ED2FBDE6F}" type="datetime1">
               <a:rPr lang="ko-KR" altLang="en-US" smtClean="0"/>
-              <a:t>2023-07-07</a:t>
+              <a:t>2023-07-08</a:t>
             </a:fld>
             <a:endParaRPr lang="ko-KR" altLang="en-US"/>
           </a:p>
@@ -1110,7 +1110,7 @@
           <a:p>
             <a:fld id="{AB448CD7-D367-43D5-B461-ACE552E75063}" type="datetime1">
               <a:rPr lang="ko-KR" altLang="en-US" smtClean="0"/>
-              <a:t>2023-07-07</a:t>
+              <a:t>2023-07-08</a:t>
             </a:fld>
             <a:endParaRPr lang="ko-KR" altLang="en-US"/>
           </a:p>
@@ -1288,7 +1288,7 @@
           <a:p>
             <a:fld id="{B6E49E79-7361-4780-8BEF-7EDE3708298A}" type="datetime1">
               <a:rPr lang="ko-KR" altLang="en-US" smtClean="0"/>
-              <a:t>2023-07-07</a:t>
+              <a:t>2023-07-08</a:t>
             </a:fld>
             <a:endParaRPr lang="ko-KR" altLang="en-US"/>
           </a:p>
@@ -1460,7 +1460,7 @@
           <a:p>
             <a:fld id="{A4D42E3C-B70B-437C-85CF-1286301B9CBA}" type="datetime1">
               <a:rPr lang="ko-KR" altLang="en-US" smtClean="0"/>
-              <a:t>2023-07-07</a:t>
+              <a:t>2023-07-08</a:t>
             </a:fld>
             <a:endParaRPr lang="ko-KR" altLang="en-US"/>
           </a:p>
@@ -1712,7 +1712,7 @@
           <a:p>
             <a:fld id="{B3369A20-5B3D-4D98-A822-26B93D177A40}" type="datetime1">
               <a:rPr lang="ko-KR" altLang="en-US" smtClean="0"/>
-              <a:t>2023-07-07</a:t>
+              <a:t>2023-07-08</a:t>
             </a:fld>
             <a:endParaRPr lang="ko-KR" altLang="en-US"/>
           </a:p>
@@ -1997,7 +1997,7 @@
           <a:p>
             <a:fld id="{685CD4CE-9E43-4F70-A9D8-A2130CA7D92A}" type="datetime1">
               <a:rPr lang="ko-KR" altLang="en-US" smtClean="0"/>
-              <a:t>2023-07-07</a:t>
+              <a:t>2023-07-08</a:t>
             </a:fld>
             <a:endParaRPr lang="ko-KR" altLang="en-US"/>
           </a:p>
@@ -2423,7 +2423,7 @@
           <a:p>
             <a:fld id="{F752BD92-DA3E-4A0B-90C9-7DE5E15B6E96}" type="datetime1">
               <a:rPr lang="ko-KR" altLang="en-US" smtClean="0"/>
-              <a:t>2023-07-07</a:t>
+              <a:t>2023-07-08</a:t>
             </a:fld>
             <a:endParaRPr lang="ko-KR" altLang="en-US"/>
           </a:p>
@@ -2547,7 +2547,7 @@
           <a:p>
             <a:fld id="{8EA2B83A-F366-424E-B742-340ACF856BB5}" type="datetime1">
               <a:rPr lang="ko-KR" altLang="en-US" smtClean="0"/>
-              <a:t>2023-07-07</a:t>
+              <a:t>2023-07-08</a:t>
             </a:fld>
             <a:endParaRPr lang="ko-KR" altLang="en-US"/>
           </a:p>
@@ -2642,7 +2642,7 @@
           <a:p>
             <a:fld id="{9A49D68B-5DBD-48E9-A8D4-FCBC4B3DD9C6}" type="datetime1">
               <a:rPr lang="ko-KR" altLang="en-US" smtClean="0"/>
-              <a:t>2023-07-07</a:t>
+              <a:t>2023-07-08</a:t>
             </a:fld>
             <a:endParaRPr lang="ko-KR" altLang="en-US"/>
           </a:p>
@@ -2917,7 +2917,7 @@
           <a:p>
             <a:fld id="{4CAB534F-7D16-467B-9320-91F98915D181}" type="datetime1">
               <a:rPr lang="ko-KR" altLang="en-US" smtClean="0"/>
-              <a:t>2023-07-07</a:t>
+              <a:t>2023-07-08</a:t>
             </a:fld>
             <a:endParaRPr lang="ko-KR" altLang="en-US"/>
           </a:p>
@@ -3169,7 +3169,7 @@
           <a:p>
             <a:fld id="{A390A91F-2F8D-4486-A69D-D680F95444B0}" type="datetime1">
               <a:rPr lang="ko-KR" altLang="en-US" smtClean="0"/>
-              <a:t>2023-07-07</a:t>
+              <a:t>2023-07-08</a:t>
             </a:fld>
             <a:endParaRPr lang="ko-KR" altLang="en-US"/>
           </a:p>
@@ -3348,7 +3348,7 @@
           <a:p>
             <a:fld id="{2238BBEA-E8DD-414A-BF68-FC2AFA7CFF2D}" type="datetime1">
               <a:rPr lang="ko-KR" altLang="en-US" smtClean="0"/>
-              <a:t>2023-07-07</a:t>
+              <a:t>2023-07-08</a:t>
             </a:fld>
             <a:endParaRPr lang="ko-KR" altLang="en-US"/>
           </a:p>
@@ -9049,19 +9049,7 @@
             </a:r>
             <a:r>
               <a:rPr lang="en-US" altLang="ko-KR" sz="2000" dirty="0" smtClean="0"/>
-              <a:t>&gt; </a:t>
-            </a:r>
-            <a:r>
-              <a:rPr lang="en-US" altLang="ko-KR" sz="2000" dirty="0" smtClean="0"/>
-              <a:t>Providers </a:t>
-            </a:r>
-            <a:r>
-              <a:rPr lang="en-US" altLang="ko-KR" sz="2000" dirty="0" smtClean="0"/>
-              <a:t>&gt; </a:t>
-            </a:r>
-            <a:r>
-              <a:rPr lang="en-US" altLang="ko-KR" sz="2000" dirty="0" smtClean="0"/>
-              <a:t>Google </a:t>
+              <a:t>&gt; Providers &gt; Google </a:t>
             </a:r>
             <a:endParaRPr lang="en-US" altLang="ko-KR" sz="2000" dirty="0"/>
           </a:p>
@@ -9237,19 +9225,7 @@
             </a:pPr>
             <a:r>
               <a:rPr lang="ko-KR" altLang="en-US" sz="2000" dirty="0" smtClean="0"/>
-              <a:t>구글</a:t>
-            </a:r>
-            <a:r>
-              <a:rPr lang="ko-KR" altLang="en-US" sz="2000" dirty="0" smtClean="0"/>
-              <a:t> </a:t>
-            </a:r>
-            <a:r>
-              <a:rPr lang="ko-KR" altLang="en-US" sz="2000" dirty="0" smtClean="0"/>
-              <a:t>개발자 </a:t>
-            </a:r>
-            <a:r>
-              <a:rPr lang="ko-KR" altLang="en-US" sz="2000" dirty="0" smtClean="0"/>
-              <a:t>센터</a:t>
+              <a:t>구글 개발자 센터</a:t>
             </a:r>
             <a:r>
               <a:rPr lang="en-US" altLang="ko-KR" sz="2000" dirty="0" smtClean="0"/>
@@ -9289,9 +9265,26 @@
           <a:lstStyle/>
           <a:p>
             <a:r>
-              <a:rPr lang="ko-KR" altLang="en-US" sz="2000" dirty="0"/>
-              <a:t>https://console.cloud.google.com/projectcreate</a:t>
-            </a:r>
+              <a:rPr lang="ko-KR" altLang="en-US" sz="2000" b="1" dirty="0">
+                <a:solidFill>
+                  <a:srgbClr val="0070C0"/>
+                </a:solidFill>
+              </a:rPr>
+              <a:t>https://</a:t>
+            </a:r>
+            <a:r>
+              <a:rPr lang="ko-KR" altLang="en-US" sz="2000" b="1" dirty="0" smtClean="0">
+                <a:solidFill>
+                  <a:srgbClr val="0070C0"/>
+                </a:solidFill>
+              </a:rPr>
+              <a:t>console.cloud.google.com</a:t>
+            </a:r>
+            <a:r>
+              <a:rPr lang="ko-KR" altLang="en-US" sz="2000" dirty="0" smtClean="0"/>
+              <a:t>/projectcreate</a:t>
+            </a:r>
+            <a:endParaRPr lang="ko-KR" altLang="en-US" sz="2000" dirty="0"/>
           </a:p>
         </p:txBody>
       </p:sp>

</xml_diff>